<commit_message>
DRAFT4 - version sent to Terry Stouch. Edits and extra SI figures from IEN.
</commit_message>
<xml_diff>
--- a/figures/NMR_microstates/NMR_microstates_figure.pptx
+++ b/figures/NMR_microstates/NMR_microstates_figure.pptx
@@ -288,7 +288,7 @@
           <a:p>
             <a:fld id="{39D665BC-AA7C-0A47-93E4-54A27B9FDDA5}" type="datetimeFigureOut">
               <a:rPr lang="en-US" smtClean="0"/>
-              <a:t>6/7/18</a:t>
+              <a:t>6/19/18</a:t>
             </a:fld>
             <a:endParaRPr lang="en-US"/>
           </a:p>
@@ -458,7 +458,7 @@
           <a:p>
             <a:fld id="{39D665BC-AA7C-0A47-93E4-54A27B9FDDA5}" type="datetimeFigureOut">
               <a:rPr lang="en-US" smtClean="0"/>
-              <a:t>6/7/18</a:t>
+              <a:t>6/19/18</a:t>
             </a:fld>
             <a:endParaRPr lang="en-US"/>
           </a:p>
@@ -638,7 +638,7 @@
           <a:p>
             <a:fld id="{39D665BC-AA7C-0A47-93E4-54A27B9FDDA5}" type="datetimeFigureOut">
               <a:rPr lang="en-US" smtClean="0"/>
-              <a:t>6/7/18</a:t>
+              <a:t>6/19/18</a:t>
             </a:fld>
             <a:endParaRPr lang="en-US"/>
           </a:p>
@@ -808,7 +808,7 @@
           <a:p>
             <a:fld id="{39D665BC-AA7C-0A47-93E4-54A27B9FDDA5}" type="datetimeFigureOut">
               <a:rPr lang="en-US" smtClean="0"/>
-              <a:t>6/7/18</a:t>
+              <a:t>6/19/18</a:t>
             </a:fld>
             <a:endParaRPr lang="en-US"/>
           </a:p>
@@ -1054,7 +1054,7 @@
           <a:p>
             <a:fld id="{39D665BC-AA7C-0A47-93E4-54A27B9FDDA5}" type="datetimeFigureOut">
               <a:rPr lang="en-US" smtClean="0"/>
-              <a:t>6/7/18</a:t>
+              <a:t>6/19/18</a:t>
             </a:fld>
             <a:endParaRPr lang="en-US"/>
           </a:p>
@@ -1342,7 +1342,7 @@
           <a:p>
             <a:fld id="{39D665BC-AA7C-0A47-93E4-54A27B9FDDA5}" type="datetimeFigureOut">
               <a:rPr lang="en-US" smtClean="0"/>
-              <a:t>6/7/18</a:t>
+              <a:t>6/19/18</a:t>
             </a:fld>
             <a:endParaRPr lang="en-US"/>
           </a:p>
@@ -1764,7 +1764,7 @@
           <a:p>
             <a:fld id="{39D665BC-AA7C-0A47-93E4-54A27B9FDDA5}" type="datetimeFigureOut">
               <a:rPr lang="en-US" smtClean="0"/>
-              <a:t>6/7/18</a:t>
+              <a:t>6/19/18</a:t>
             </a:fld>
             <a:endParaRPr lang="en-US"/>
           </a:p>
@@ -1882,7 +1882,7 @@
           <a:p>
             <a:fld id="{39D665BC-AA7C-0A47-93E4-54A27B9FDDA5}" type="datetimeFigureOut">
               <a:rPr lang="en-US" smtClean="0"/>
-              <a:t>6/7/18</a:t>
+              <a:t>6/19/18</a:t>
             </a:fld>
             <a:endParaRPr lang="en-US"/>
           </a:p>
@@ -1977,7 +1977,7 @@
           <a:p>
             <a:fld id="{39D665BC-AA7C-0A47-93E4-54A27B9FDDA5}" type="datetimeFigureOut">
               <a:rPr lang="en-US" smtClean="0"/>
-              <a:t>6/7/18</a:t>
+              <a:t>6/19/18</a:t>
             </a:fld>
             <a:endParaRPr lang="en-US"/>
           </a:p>
@@ -2254,7 +2254,7 @@
           <a:p>
             <a:fld id="{39D665BC-AA7C-0A47-93E4-54A27B9FDDA5}" type="datetimeFigureOut">
               <a:rPr lang="en-US" smtClean="0"/>
-              <a:t>6/7/18</a:t>
+              <a:t>6/19/18</a:t>
             </a:fld>
             <a:endParaRPr lang="en-US"/>
           </a:p>
@@ -2507,7 +2507,7 @@
           <a:p>
             <a:fld id="{39D665BC-AA7C-0A47-93E4-54A27B9FDDA5}" type="datetimeFigureOut">
               <a:rPr lang="en-US" smtClean="0"/>
-              <a:t>6/7/18</a:t>
+              <a:t>6/19/18</a:t>
             </a:fld>
             <a:endParaRPr lang="en-US"/>
           </a:p>
@@ -2720,7 +2720,7 @@
           <a:p>
             <a:fld id="{39D665BC-AA7C-0A47-93E4-54A27B9FDDA5}" type="datetimeFigureOut">
               <a:rPr lang="en-US" smtClean="0"/>
-              <a:t>6/7/18</a:t>
+              <a:t>6/19/18</a:t>
             </a:fld>
             <a:endParaRPr lang="en-US"/>
           </a:p>
@@ -3097,58 +3097,22 @@
       </p:grpSpPr>
       <p:pic>
         <p:nvPicPr>
-          <p:cNvPr id="5" name="Picture 4" descr="M04_15N_chemical_shifts.png"/>
+          <p:cNvPr id="6" name="Picture 5"/>
           <p:cNvPicPr>
             <a:picLocks noChangeAspect="1"/>
           </p:cNvPicPr>
           <p:nvPr/>
         </p:nvPicPr>
         <p:blipFill>
-          <a:blip r:embed="rId2">
-            <a:extLst>
-              <a:ext uri="{28A0092B-C50C-407E-A947-70E740481C1C}">
-                <a14:useLocalDpi xmlns:a14="http://schemas.microsoft.com/office/drawing/2010/main" val="0"/>
-              </a:ext>
-            </a:extLst>
-          </a:blip>
+          <a:blip r:embed="rId2"/>
           <a:stretch>
             <a:fillRect/>
           </a:stretch>
         </p:blipFill>
         <p:spPr>
           <a:xfrm>
-            <a:off x="3529" y="200520"/>
-            <a:ext cx="3664995" cy="3186740"/>
-          </a:xfrm>
-          <a:prstGeom prst="rect">
-            <a:avLst/>
-          </a:prstGeom>
-        </p:spPr>
-      </p:pic>
-      <p:pic>
-        <p:nvPicPr>
-          <p:cNvPr id="6" name="Picture 5" descr="M14_15N_chemical_shifts.png"/>
-          <p:cNvPicPr>
-            <a:picLocks noChangeAspect="1"/>
-          </p:cNvPicPr>
-          <p:nvPr/>
-        </p:nvPicPr>
-        <p:blipFill>
-          <a:blip r:embed="rId3">
-            <a:extLst>
-              <a:ext uri="{28A0092B-C50C-407E-A947-70E740481C1C}">
-                <a14:useLocalDpi xmlns:a14="http://schemas.microsoft.com/office/drawing/2010/main" val="0"/>
-              </a:ext>
-            </a:extLst>
-          </a:blip>
-          <a:stretch>
-            <a:fillRect/>
-          </a:stretch>
-        </p:blipFill>
-        <p:spPr>
-          <a:xfrm>
-            <a:off x="3529" y="3595096"/>
-            <a:ext cx="3746866" cy="3262271"/>
+            <a:off x="83193" y="3776690"/>
+            <a:ext cx="3536307" cy="3107504"/>
           </a:xfrm>
           <a:prstGeom prst="rect">
             <a:avLst/>
@@ -3303,7 +3267,7 @@
           <p:nvPr/>
         </p:nvPicPr>
         <p:blipFill>
-          <a:blip r:embed="rId4"/>
+          <a:blip r:embed="rId3"/>
           <a:stretch>
             <a:fillRect/>
           </a:stretch>
@@ -3327,7 +3291,7 @@
           <p:nvPr/>
         </p:nvPicPr>
         <p:blipFill>
-          <a:blip r:embed="rId5"/>
+          <a:blip r:embed="rId4"/>
           <a:stretch>
             <a:fillRect/>
           </a:stretch>
@@ -3336,6 +3300,30 @@
           <a:xfrm>
             <a:off x="4211051" y="989263"/>
             <a:ext cx="3957053" cy="1790338"/>
+          </a:xfrm>
+          <a:prstGeom prst="rect">
+            <a:avLst/>
+          </a:prstGeom>
+        </p:spPr>
+      </p:pic>
+      <p:pic>
+        <p:nvPicPr>
+          <p:cNvPr id="5" name="Picture 4"/>
+          <p:cNvPicPr>
+            <a:picLocks noChangeAspect="1"/>
+          </p:cNvPicPr>
+          <p:nvPr/>
+        </p:nvPicPr>
+        <p:blipFill>
+          <a:blip r:embed="rId5"/>
+          <a:stretch>
+            <a:fillRect/>
+          </a:stretch>
+        </p:blipFill>
+        <p:spPr>
+          <a:xfrm>
+            <a:off x="67209" y="330088"/>
+            <a:ext cx="3543174" cy="3094265"/>
           </a:xfrm>
           <a:prstGeom prst="rect">
             <a:avLst/>

</xml_diff>